<commit_message>
revised icon gradient color
</commit_message>
<xml_diff>
--- a/Img/icons.pptx
+++ b/Img/icons.pptx
@@ -3573,8 +3573,8 @@
               <a:gsLst>
                 <a:gs pos="0">
                   <a:schemeClr val="accent1">
-                    <a:lumMod val="20000"/>
-                    <a:lumOff val="80000"/>
+                    <a:lumMod val="40000"/>
+                    <a:lumOff val="60000"/>
                   </a:schemeClr>
                 </a:gs>
                 <a:gs pos="50000">

</xml_diff>

<commit_message>
Delaunay Base class added and ui updated
</commit_message>
<xml_diff>
--- a/Img/icons.pptx
+++ b/Img/icons.pptx
@@ -4491,6 +4491,102 @@
           </p:txBody>
         </p:sp>
       </p:grpSp>
+      <p:grpSp>
+        <p:nvGrpSpPr>
+          <p:cNvPr id="52" name="组合 51"/>
+          <p:cNvGrpSpPr/>
+          <p:nvPr/>
+        </p:nvGrpSpPr>
+        <p:grpSpPr>
+          <a:xfrm>
+            <a:off x="5554216" y="1275430"/>
+            <a:ext cx="900000" cy="900000"/>
+            <a:chOff x="5554216" y="1275430"/>
+            <a:chExt cx="900000" cy="900000"/>
+          </a:xfrm>
+        </p:grpSpPr>
+        <p:sp>
+          <p:nvSpPr>
+            <p:cNvPr id="45" name="圆角矩形 44"/>
+            <p:cNvSpPr/>
+            <p:nvPr/>
+          </p:nvSpPr>
+          <p:spPr>
+            <a:xfrm>
+              <a:off x="5554216" y="1275430"/>
+              <a:ext cx="900000" cy="900000"/>
+            </a:xfrm>
+            <a:prstGeom prst="roundRect">
+              <a:avLst/>
+            </a:prstGeom>
+            <a:gradFill>
+              <a:gsLst>
+                <a:gs pos="0">
+                  <a:srgbClr val="FFCCFF"/>
+                </a:gs>
+                <a:gs pos="50000">
+                  <a:srgbClr val="FF99CC"/>
+                </a:gs>
+                <a:gs pos="100000">
+                  <a:srgbClr val="FF6699"/>
+                </a:gs>
+              </a:gsLst>
+            </a:gradFill>
+          </p:spPr>
+          <p:style>
+            <a:lnRef idx="0">
+              <a:schemeClr val="accent4"/>
+            </a:lnRef>
+            <a:fillRef idx="3">
+              <a:schemeClr val="accent4"/>
+            </a:fillRef>
+            <a:effectRef idx="3">
+              <a:schemeClr val="accent4"/>
+            </a:effectRef>
+            <a:fontRef idx="minor">
+              <a:schemeClr val="lt1"/>
+            </a:fontRef>
+          </p:style>
+          <p:txBody>
+            <a:bodyPr rtlCol="0" anchor="ctr"/>
+            <a:lstStyle/>
+            <a:p>
+              <a:pPr algn="ctr"/>
+              <a:endParaRPr lang="zh-CN" altLang="en-US"/>
+            </a:p>
+          </p:txBody>
+        </p:sp>
+        <p:pic>
+          <p:nvPicPr>
+            <p:cNvPr id="51" name="图片 50"/>
+            <p:cNvPicPr>
+              <a:picLocks noChangeAspect="1"/>
+            </p:cNvPicPr>
+            <p:nvPr/>
+          </p:nvPicPr>
+          <p:blipFill>
+            <a:blip r:embed="rId3" cstate="print">
+              <a:extLst>
+                <a:ext uri="{28A0092B-C50C-407E-A947-70E740481C1C}">
+                  <a14:useLocalDpi xmlns:a14="http://schemas.microsoft.com/office/drawing/2010/main" val="0"/>
+                </a:ext>
+              </a:extLst>
+            </a:blip>
+            <a:stretch>
+              <a:fillRect/>
+            </a:stretch>
+          </p:blipFill>
+          <p:spPr>
+            <a:xfrm>
+              <a:off x="5707264" y="1487538"/>
+              <a:ext cx="647390" cy="547247"/>
+            </a:xfrm>
+            <a:prstGeom prst="rect">
+              <a:avLst/>
+            </a:prstGeom>
+          </p:spPr>
+        </p:pic>
+      </p:grpSp>
     </p:spTree>
     <p:extLst>
       <p:ext uri="{BB962C8B-B14F-4D97-AF65-F5344CB8AC3E}">

</xml_diff>

<commit_message>
ui revised and snapshot added
</commit_message>
<xml_diff>
--- a/Img/icons.pptx
+++ b/Img/icons.pptx
@@ -243,7 +243,7 @@
           <a:p>
             <a:fld id="{64F94C6B-D019-472B-9D8B-E0ABBDFE852A}" type="datetimeFigureOut">
               <a:rPr lang="zh-CN" altLang="en-US" smtClean="0"/>
-              <a:t>2014/6/10</a:t>
+              <a:t>2014/6/11</a:t>
             </a:fld>
             <a:endParaRPr lang="zh-CN" altLang="en-US"/>
           </a:p>
@@ -413,7 +413,7 @@
           <a:p>
             <a:fld id="{64F94C6B-D019-472B-9D8B-E0ABBDFE852A}" type="datetimeFigureOut">
               <a:rPr lang="zh-CN" altLang="en-US" smtClean="0"/>
-              <a:t>2014/6/10</a:t>
+              <a:t>2014/6/11</a:t>
             </a:fld>
             <a:endParaRPr lang="zh-CN" altLang="en-US"/>
           </a:p>
@@ -593,7 +593,7 @@
           <a:p>
             <a:fld id="{64F94C6B-D019-472B-9D8B-E0ABBDFE852A}" type="datetimeFigureOut">
               <a:rPr lang="zh-CN" altLang="en-US" smtClean="0"/>
-              <a:t>2014/6/10</a:t>
+              <a:t>2014/6/11</a:t>
             </a:fld>
             <a:endParaRPr lang="zh-CN" altLang="en-US"/>
           </a:p>
@@ -763,7 +763,7 @@
           <a:p>
             <a:fld id="{64F94C6B-D019-472B-9D8B-E0ABBDFE852A}" type="datetimeFigureOut">
               <a:rPr lang="zh-CN" altLang="en-US" smtClean="0"/>
-              <a:t>2014/6/10</a:t>
+              <a:t>2014/6/11</a:t>
             </a:fld>
             <a:endParaRPr lang="zh-CN" altLang="en-US"/>
           </a:p>
@@ -1009,7 +1009,7 @@
           <a:p>
             <a:fld id="{64F94C6B-D019-472B-9D8B-E0ABBDFE852A}" type="datetimeFigureOut">
               <a:rPr lang="zh-CN" altLang="en-US" smtClean="0"/>
-              <a:t>2014/6/10</a:t>
+              <a:t>2014/6/11</a:t>
             </a:fld>
             <a:endParaRPr lang="zh-CN" altLang="en-US"/>
           </a:p>
@@ -1241,7 +1241,7 @@
           <a:p>
             <a:fld id="{64F94C6B-D019-472B-9D8B-E0ABBDFE852A}" type="datetimeFigureOut">
               <a:rPr lang="zh-CN" altLang="en-US" smtClean="0"/>
-              <a:t>2014/6/10</a:t>
+              <a:t>2014/6/11</a:t>
             </a:fld>
             <a:endParaRPr lang="zh-CN" altLang="en-US"/>
           </a:p>
@@ -1608,7 +1608,7 @@
           <a:p>
             <a:fld id="{64F94C6B-D019-472B-9D8B-E0ABBDFE852A}" type="datetimeFigureOut">
               <a:rPr lang="zh-CN" altLang="en-US" smtClean="0"/>
-              <a:t>2014/6/10</a:t>
+              <a:t>2014/6/11</a:t>
             </a:fld>
             <a:endParaRPr lang="zh-CN" altLang="en-US"/>
           </a:p>
@@ -1726,7 +1726,7 @@
           <a:p>
             <a:fld id="{64F94C6B-D019-472B-9D8B-E0ABBDFE852A}" type="datetimeFigureOut">
               <a:rPr lang="zh-CN" altLang="en-US" smtClean="0"/>
-              <a:t>2014/6/10</a:t>
+              <a:t>2014/6/11</a:t>
             </a:fld>
             <a:endParaRPr lang="zh-CN" altLang="en-US"/>
           </a:p>
@@ -1821,7 +1821,7 @@
           <a:p>
             <a:fld id="{64F94C6B-D019-472B-9D8B-E0ABBDFE852A}" type="datetimeFigureOut">
               <a:rPr lang="zh-CN" altLang="en-US" smtClean="0"/>
-              <a:t>2014/6/10</a:t>
+              <a:t>2014/6/11</a:t>
             </a:fld>
             <a:endParaRPr lang="zh-CN" altLang="en-US"/>
           </a:p>
@@ -2098,7 +2098,7 @@
           <a:p>
             <a:fld id="{64F94C6B-D019-472B-9D8B-E0ABBDFE852A}" type="datetimeFigureOut">
               <a:rPr lang="zh-CN" altLang="en-US" smtClean="0"/>
-              <a:t>2014/6/10</a:t>
+              <a:t>2014/6/11</a:t>
             </a:fld>
             <a:endParaRPr lang="zh-CN" altLang="en-US"/>
           </a:p>
@@ -2351,7 +2351,7 @@
           <a:p>
             <a:fld id="{64F94C6B-D019-472B-9D8B-E0ABBDFE852A}" type="datetimeFigureOut">
               <a:rPr lang="zh-CN" altLang="en-US" smtClean="0"/>
-              <a:t>2014/6/10</a:t>
+              <a:t>2014/6/11</a:t>
             </a:fld>
             <a:endParaRPr lang="zh-CN" altLang="en-US"/>
           </a:p>
@@ -2564,7 +2564,7 @@
           <a:p>
             <a:fld id="{64F94C6B-D019-472B-9D8B-E0ABBDFE852A}" type="datetimeFigureOut">
               <a:rPr lang="zh-CN" altLang="en-US" smtClean="0"/>
-              <a:t>2014/6/10</a:t>
+              <a:t>2014/6/11</a:t>
             </a:fld>
             <a:endParaRPr lang="zh-CN" altLang="en-US"/>
           </a:p>
@@ -4587,6 +4587,113 @@
           </p:spPr>
         </p:pic>
       </p:grpSp>
+      <p:grpSp>
+        <p:nvGrpSpPr>
+          <p:cNvPr id="3" name="组合 2"/>
+          <p:cNvGrpSpPr/>
+          <p:nvPr/>
+        </p:nvGrpSpPr>
+        <p:grpSpPr>
+          <a:xfrm>
+            <a:off x="6743659" y="4645506"/>
+            <a:ext cx="900000" cy="900000"/>
+            <a:chOff x="6743659" y="4645506"/>
+            <a:chExt cx="900000" cy="900000"/>
+          </a:xfrm>
+        </p:grpSpPr>
+        <p:sp>
+          <p:nvSpPr>
+            <p:cNvPr id="47" name="圆角矩形 46"/>
+            <p:cNvSpPr/>
+            <p:nvPr/>
+          </p:nvSpPr>
+          <p:spPr>
+            <a:xfrm>
+              <a:off x="6743659" y="4645506"/>
+              <a:ext cx="900000" cy="900000"/>
+            </a:xfrm>
+            <a:prstGeom prst="roundRect">
+              <a:avLst/>
+            </a:prstGeom>
+            <a:gradFill>
+              <a:gsLst>
+                <a:gs pos="0">
+                  <a:srgbClr val="66FFFF"/>
+                </a:gs>
+                <a:gs pos="50000">
+                  <a:srgbClr val="00CCFF"/>
+                </a:gs>
+                <a:gs pos="100000">
+                  <a:srgbClr val="3399FF"/>
+                </a:gs>
+              </a:gsLst>
+            </a:gradFill>
+          </p:spPr>
+          <p:style>
+            <a:lnRef idx="0">
+              <a:schemeClr val="accent4"/>
+            </a:lnRef>
+            <a:fillRef idx="3">
+              <a:schemeClr val="accent4"/>
+            </a:fillRef>
+            <a:effectRef idx="3">
+              <a:schemeClr val="accent4"/>
+            </a:effectRef>
+            <a:fontRef idx="minor">
+              <a:schemeClr val="lt1"/>
+            </a:fontRef>
+          </p:style>
+          <p:txBody>
+            <a:bodyPr rtlCol="0" anchor="ctr"/>
+            <a:lstStyle/>
+            <a:p>
+              <a:pPr algn="ctr"/>
+              <a:endParaRPr lang="zh-CN" altLang="en-US"/>
+            </a:p>
+          </p:txBody>
+        </p:sp>
+        <p:pic>
+          <p:nvPicPr>
+            <p:cNvPr id="1032" name="Picture 8" descr="http://icons.iconarchive.com/icons/icons8/android/512/Photo-Video-slr-camera-icon.png"/>
+            <p:cNvPicPr>
+              <a:picLocks noChangeAspect="1" noChangeArrowheads="1"/>
+            </p:cNvPicPr>
+            <p:nvPr/>
+          </p:nvPicPr>
+          <p:blipFill>
+            <a:blip r:embed="rId4" cstate="print">
+              <a:extLst>
+                <a:ext uri="{28A0092B-C50C-407E-A947-70E740481C1C}">
+                  <a14:useLocalDpi xmlns:a14="http://schemas.microsoft.com/office/drawing/2010/main" val="0"/>
+                </a:ext>
+              </a:extLst>
+            </a:blip>
+            <a:srcRect/>
+            <a:stretch>
+              <a:fillRect/>
+            </a:stretch>
+          </p:blipFill>
+          <p:spPr bwMode="auto">
+            <a:xfrm>
+              <a:off x="6924014" y="4863315"/>
+              <a:ext cx="539290" cy="539290"/>
+            </a:xfrm>
+            <a:prstGeom prst="rect">
+              <a:avLst/>
+            </a:prstGeom>
+            <a:noFill/>
+            <a:extLst>
+              <a:ext uri="{909E8E84-426E-40DD-AFC4-6F175D3DCCD1}">
+                <a14:hiddenFill xmlns:a14="http://schemas.microsoft.com/office/drawing/2010/main">
+                  <a:solidFill>
+                    <a:srgbClr val="FFFFFF"/>
+                  </a:solidFill>
+                </a14:hiddenFill>
+              </a:ext>
+            </a:extLst>
+          </p:spPr>
+        </p:pic>
+      </p:grpSp>
     </p:spTree>
     <p:extLst>
       <p:ext uri="{BB962C8B-B14F-4D97-AF65-F5344CB8AC3E}">

</xml_diff>